<commit_message>
updated links and dates
</commit_message>
<xml_diff>
--- a/powerpoint/Session1.pptx
+++ b/powerpoint/Session1.pptx
@@ -38410,9 +38410,6 @@
           </a:p>
           <a:p>
             <a:pPr marL="285840" indent="-284760">
-              <a:lnSpc>
-                <a:spcPct val="100000"/>
-              </a:lnSpc>
               <a:spcBef>
                 <a:spcPts val="720"/>
               </a:spcBef>
@@ -38433,21 +38430,27 @@
                 </a:solidFill>
                 <a:latin typeface="Calibri"/>
               </a:rPr>
-              <a:t>GitHub repository </a:t>
+              <a:t>GitHub repository: </a:t>
             </a:r>
             <a:r>
-              <a:rPr lang="en-US" sz="2400" spc="-1" dirty="0">
+              <a:rPr lang="en-US" sz="3600" spc="-1" dirty="0">
                 <a:solidFill>
                   <a:srgbClr val="000000"/>
                 </a:solidFill>
                 <a:latin typeface="Calibri"/>
                 <a:hlinkClick r:id="rId2"/>
               </a:rPr>
-              <a:t>https://github.com/sraorao/MSD_R_course_HT2022/</a:t>
+              <a:t>https://github.com/sraorao/MSD_R_course_Mar2022</a:t>
             </a:r>
-            <a:endParaRPr lang="en-GB" sz="2400" b="0" strike="noStrike" spc="-1" dirty="0">
-              <a:latin typeface="Arial"/>
-            </a:endParaRPr>
+            <a:r>
+              <a:rPr lang="en-US" sz="3600" spc="-1" dirty="0">
+                <a:solidFill>
+                  <a:srgbClr val="000000"/>
+                </a:solidFill>
+                <a:latin typeface="Calibri"/>
+              </a:rPr>
+              <a:t>  </a:t>
+            </a:r>
           </a:p>
           <a:p>
             <a:pPr marL="285840" indent="-284760">

</xml_diff>